<commit_message>
Dodane uloge u prezentaciju
</commit_message>
<xml_diff>
--- a/PROGI_projekt.pptx
+++ b/PROGI_projekt.pptx
@@ -10,7 +10,7 @@
   <p:sldIdLst>
     <p:sldId id="256" r:id="rId2"/>
     <p:sldId id="257" r:id="rId3"/>
-    <p:sldId id="265" r:id="rId4"/>
+    <p:sldId id="275" r:id="rId4"/>
     <p:sldId id="258" r:id="rId5"/>
     <p:sldId id="259" r:id="rId6"/>
     <p:sldId id="267" r:id="rId7"/>
@@ -6629,13 +6629,26 @@
               <a:rPr lang="en-US" sz="2400" dirty="0" err="1"/>
               <a:t>Ljubotina</a:t>
             </a:r>
+            <a:r>
+              <a:rPr lang="en-US" sz="2400" dirty="0"/>
+              <a:t> - </a:t>
+            </a:r>
+            <a:r>
+              <a:rPr lang="en-US" sz="2400" dirty="0" err="1"/>
+              <a:t>Voditelj</a:t>
+            </a:r>
             <a:endParaRPr lang="en-US" sz="2400" dirty="0"/>
           </a:p>
           <a:p>
             <a:r>
               <a:rPr lang="en-US" sz="2400" dirty="0"/>
-              <a:t>Marko Pavić</a:t>
-            </a:r>
+              <a:t>Marko Pavić – BE </a:t>
+            </a:r>
+            <a:r>
+              <a:rPr lang="en-US" sz="2400" dirty="0" err="1"/>
+              <a:t>Inžinjer</a:t>
+            </a:r>
+            <a:endParaRPr lang="en-US" sz="2400" dirty="0"/>
           </a:p>
           <a:p>
             <a:r>
@@ -6644,7 +6657,15 @@
             </a:r>
             <a:r>
               <a:rPr lang="en-GB" sz="2400" dirty="0" err="1"/>
-              <a:t>Breznicki-Herceg</a:t>
+              <a:t>Breznički-Herceg</a:t>
+            </a:r>
+            <a:r>
+              <a:rPr lang="en-GB" sz="2400" dirty="0"/>
+              <a:t> - </a:t>
+            </a:r>
+            <a:r>
+              <a:rPr lang="en-GB" sz="2400" dirty="0" err="1"/>
+              <a:t>Dokumentacija</a:t>
             </a:r>
             <a:endParaRPr lang="en-US" sz="2400" dirty="0"/>
           </a:p>
@@ -6657,6 +6678,14 @@
               <a:rPr lang="en-US" sz="2400" dirty="0" err="1"/>
               <a:t>Ćorić</a:t>
             </a:r>
+            <a:r>
+              <a:rPr lang="en-US" sz="2400" dirty="0"/>
+              <a:t> – FE </a:t>
+            </a:r>
+            <a:r>
+              <a:rPr lang="en-US" sz="2400" dirty="0" err="1"/>
+              <a:t>Inžinjer</a:t>
+            </a:r>
             <a:endParaRPr lang="en-US" sz="2400" dirty="0"/>
           </a:p>
           <a:p>
@@ -6668,7 +6697,10 @@
               <a:rPr lang="en-US" sz="2400" dirty="0" err="1"/>
               <a:t>Vuksanović</a:t>
             </a:r>
-            <a:endParaRPr lang="en-US" sz="2400" dirty="0"/>
+            <a:r>
+              <a:rPr lang="en-US" sz="2400" dirty="0"/>
+              <a:t> – FE Lead </a:t>
+            </a:r>
           </a:p>
           <a:p>
             <a:r>
@@ -6677,7 +6709,15 @@
             </a:r>
             <a:r>
               <a:rPr lang="en-GB" sz="2400" dirty="0" err="1"/>
-              <a:t>Klaric</a:t>
+              <a:t>Klarić</a:t>
+            </a:r>
+            <a:r>
+              <a:rPr lang="en-GB" sz="2400" dirty="0"/>
+              <a:t> -  </a:t>
+            </a:r>
+            <a:r>
+              <a:rPr lang="en-GB" sz="2400" dirty="0" err="1"/>
+              <a:t>Dokumentacija</a:t>
             </a:r>
             <a:endParaRPr lang="en-GB" sz="2400" dirty="0"/>
           </a:p>
@@ -6689,6 +6729,14 @@
             <a:r>
               <a:rPr lang="en-GB" sz="2400" dirty="0" err="1"/>
               <a:t>Milin</a:t>
+            </a:r>
+            <a:r>
+              <a:rPr lang="en-GB" sz="2400" dirty="0"/>
+              <a:t> - </a:t>
+            </a:r>
+            <a:r>
+              <a:rPr lang="en-GB" sz="2400" dirty="0" err="1"/>
+              <a:t>Dokumentacija</a:t>
             </a:r>
             <a:endParaRPr lang="hr-HR" sz="2400" dirty="0"/>
           </a:p>
@@ -6726,7 +6774,7 @@
     </p:spTree>
     <p:extLst>
       <p:ext uri="{BB962C8B-B14F-4D97-AF65-F5344CB8AC3E}">
-        <p14:creationId xmlns:p14="http://schemas.microsoft.com/office/powerpoint/2010/main" val="1667652035"/>
+        <p14:creationId xmlns:p14="http://schemas.microsoft.com/office/powerpoint/2010/main" val="1796163605"/>
       </p:ext>
     </p:extLst>
   </p:cSld>

</xml_diff>